<commit_message>
added admin menu with submenu for each component
</commit_message>
<xml_diff>
--- a/com.supeyou.project/doc/SupeYou.scenario.nikolaus.pptx
+++ b/com.supeyou.project/doc/SupeYou.scenario.nikolaus.pptx
@@ -13827,18 +13827,7 @@
                   </a:schemeClr>
                 </a:solidFill>
               </a:rPr>
-              <a:t>OK, thats easy with Paypal</a:t>
-            </a:r>
-            <a:r>
-              <a:rPr lang="de-DE" sz="1400" dirty="0" smtClean="0">
-                <a:solidFill>
-                  <a:schemeClr val="tx1">
-                    <a:lumMod val="65000"/>
-                    <a:lumOff val="35000"/>
-                  </a:schemeClr>
-                </a:solidFill>
-              </a:rPr>
-              <a:t>. </a:t>
+              <a:t>OK, thats easy with Paypal. </a:t>
             </a:r>
             <a:r>
               <a:rPr lang="de-DE" sz="1400" dirty="0" err="1" smtClean="0">
@@ -13943,11 +13932,7 @@
           <a:p>
             <a:r>
               <a:rPr lang="de-DE" sz="1200" dirty="0" smtClean="0"/>
-              <a:t>nikolaus@willkommen</a:t>
-            </a:r>
-            <a:r>
-              <a:rPr lang="de-DE" sz="1200" dirty="0" smtClean="0"/>
-              <a:t>-in.de</a:t>
+              <a:t>nikolaus@willkommen-in.de</a:t>
             </a:r>
             <a:endParaRPr lang="en-US" sz="1200" dirty="0"/>
           </a:p>
@@ -16016,11 +16001,7 @@
           <a:p>
             <a:r>
               <a:rPr lang="de-DE" sz="11500" dirty="0" smtClean="0"/>
-              <a:t>Next </a:t>
-            </a:r>
-            <a:r>
-              <a:rPr lang="de-DE" sz="11500" dirty="0" smtClean="0"/>
-              <a:t>week…</a:t>
+              <a:t>Next week…</a:t>
             </a:r>
             <a:endParaRPr lang="en-US" sz="11500" dirty="0"/>
           </a:p>
@@ -17710,18 +17691,7 @@
                   </a:schemeClr>
                 </a:solidFill>
               </a:rPr>
-              <a:t>3.506 </a:t>
-            </a:r>
-            <a:r>
-              <a:rPr lang="de-DE" sz="2400" b="1" dirty="0" smtClean="0">
-                <a:solidFill>
-                  <a:schemeClr val="tx1">
-                    <a:lumMod val="50000"/>
-                    <a:lumOff val="50000"/>
-                  </a:schemeClr>
-                </a:solidFill>
-              </a:rPr>
-              <a:t>€</a:t>
+              <a:t>3.506 €</a:t>
             </a:r>
             <a:r>
               <a:rPr lang="de-DE" sz="2000" dirty="0" smtClean="0">
@@ -18204,17 +18174,7 @@
                   </a:schemeClr>
                 </a:solidFill>
               </a:rPr>
-              <a:t>2</a:t>
-            </a:r>
-            <a:r>
-              <a:rPr lang="de-DE" sz="1050" dirty="0" smtClean="0">
-                <a:solidFill>
-                  <a:schemeClr val="bg1">
-                    <a:lumMod val="50000"/>
-                  </a:schemeClr>
-                </a:solidFill>
-              </a:rPr>
-              <a:t>.470€</a:t>
+              <a:t>2.470€</a:t>
             </a:r>
             <a:endParaRPr lang="en-US" sz="1050" dirty="0">
               <a:solidFill>
@@ -23112,29 +23072,7 @@
                   </a:schemeClr>
                 </a:solidFill>
               </a:rPr>
-              <a:t>Ah, thats nice. I can show what I have done for </a:t>
-            </a:r>
-            <a:r>
-              <a:rPr lang="de-DE" sz="1400" dirty="0" smtClean="0">
-                <a:solidFill>
-                  <a:schemeClr val="tx1">
-                    <a:lumMod val="65000"/>
-                    <a:lumOff val="35000"/>
-                  </a:schemeClr>
-                </a:solidFill>
-              </a:rPr>
-              <a:t>Nikolaus on </a:t>
-            </a:r>
-            <a:r>
-              <a:rPr lang="de-DE" sz="1400" dirty="0" smtClean="0">
-                <a:solidFill>
-                  <a:schemeClr val="tx1">
-                    <a:lumMod val="65000"/>
-                    <a:lumOff val="35000"/>
-                  </a:schemeClr>
-                </a:solidFill>
-              </a:rPr>
-              <a:t>my business website.</a:t>
+              <a:t>Ah, thats nice. I can show what I have done for Nikolaus on my business website.</a:t>
             </a:r>
             <a:endParaRPr lang="en-US" sz="1400" dirty="0">
               <a:solidFill>
@@ -26635,51 +26573,7 @@
                   </a:schemeClr>
                 </a:solidFill>
               </a:rPr>
-              <a:t>Meine Mission ist es Flüchtlingen zu helfen. Dafür betreue und entwickle ich mit meinem Team die Seite willkommen-in.de. Mit </a:t>
-            </a:r>
-            <a:r>
-              <a:rPr lang="de-DE" sz="1400" dirty="0" smtClean="0">
-                <a:solidFill>
-                  <a:schemeClr val="tx1">
-                    <a:lumMod val="65000"/>
-                    <a:lumOff val="35000"/>
-                  </a:schemeClr>
-                </a:solidFill>
-              </a:rPr>
-              <a:t>der </a:t>
-            </a:r>
-            <a:r>
-              <a:rPr lang="de-DE" sz="1400" dirty="0" smtClean="0">
-                <a:solidFill>
-                  <a:schemeClr val="tx1">
-                    <a:lumMod val="65000"/>
-                    <a:lumOff val="35000"/>
-                  </a:schemeClr>
-                </a:solidFill>
-              </a:rPr>
-              <a:t>Seite wird die unglaubliche Hilfsbereitschaft aus der Bevölkerung für Flüchtlinge an die richtigen Stellen gebracht. </a:t>
-            </a:r>
-            <a:r>
-              <a:rPr lang="de-DE" sz="1400" dirty="0" smtClean="0">
-                <a:solidFill>
-                  <a:schemeClr val="tx1">
-                    <a:lumMod val="65000"/>
-                    <a:lumOff val="35000"/>
-                  </a:schemeClr>
-                </a:solidFill>
-              </a:rPr>
-              <a:t>Für </a:t>
-            </a:r>
-            <a:r>
-              <a:rPr lang="de-DE" sz="1400" dirty="0" smtClean="0">
-                <a:solidFill>
-                  <a:schemeClr val="tx1">
-                    <a:lumMod val="65000"/>
-                    <a:lumOff val="35000"/>
-                  </a:schemeClr>
-                </a:solidFill>
-              </a:rPr>
-              <a:t>weitere Informationen klickt einfach den Link unten.</a:t>
+              <a:t>Meine Mission ist es Flüchtlingen zu helfen. Dafür betreue und entwickle ich mit meinem Team die Seite willkommen-in.de. Mit der Seite wird die unglaubliche Hilfsbereitschaft aus der Bevölkerung für Flüchtlinge an die richtigen Stellen gebracht. Für weitere Informationen klickt einfach den Link unten.</a:t>
             </a:r>
           </a:p>
           <a:p>
@@ -26702,29 +26596,7 @@
                   </a:schemeClr>
                 </a:solidFill>
               </a:rPr>
-              <a:t>Um die Seite weiter zu betreuen braucht mein Team Deine Unterstützung. Ein Euro/Monat und eine </a:t>
-            </a:r>
-            <a:r>
-              <a:rPr lang="de-DE" sz="1400" dirty="0" smtClean="0">
-                <a:solidFill>
-                  <a:schemeClr val="tx1">
-                    <a:lumMod val="65000"/>
-                    <a:lumOff val="35000"/>
-                  </a:schemeClr>
-                </a:solidFill>
-              </a:rPr>
-              <a:t>persönliche Einladung </a:t>
-            </a:r>
-            <a:r>
-              <a:rPr lang="de-DE" sz="1400" dirty="0" smtClean="0">
-                <a:solidFill>
-                  <a:schemeClr val="tx1">
-                    <a:lumMod val="65000"/>
-                    <a:lumOff val="35000"/>
-                  </a:schemeClr>
-                </a:solidFill>
-              </a:rPr>
-              <a:t>an einige Deiner Freunde würden uns helfen mit 100% bei der Sache zu bleiben.</a:t>
+              <a:t>Um die Seite weiter zu betreuen braucht mein Team Deine Unterstützung. Ein Euro/Monat und eine persönliche Einladung an einige Deiner Freunde würden uns helfen mit 100% bei der Sache zu bleiben.</a:t>
             </a:r>
           </a:p>
           <a:p>
@@ -26747,29 +26619,7 @@
                   </a:schemeClr>
                 </a:solidFill>
               </a:rPr>
-              <a:t>Ich garantiere persönlich, dass alle Spenden gemäß meiner Mission eingesetzt </a:t>
-            </a:r>
-            <a:r>
-              <a:rPr lang="de-DE" sz="1400" dirty="0" smtClean="0">
-                <a:solidFill>
-                  <a:schemeClr val="tx1">
-                    <a:lumMod val="65000"/>
-                    <a:lumOff val="35000"/>
-                  </a:schemeClr>
-                </a:solidFill>
-              </a:rPr>
-              <a:t>werden und werde </a:t>
-            </a:r>
-            <a:r>
-              <a:rPr lang="de-DE" sz="1400" dirty="0" smtClean="0">
-                <a:solidFill>
-                  <a:schemeClr val="tx1">
-                    <a:lumMod val="65000"/>
-                    <a:lumOff val="35000"/>
-                  </a:schemeClr>
-                </a:solidFill>
-              </a:rPr>
-              <a:t>die Verwendung detailliert veröffentlichen.</a:t>
+              <a:t>Ich garantiere persönlich, dass alle Spenden gemäß meiner Mission eingesetzt werden und werde die Verwendung detailliert veröffentlichen.</a:t>
             </a:r>
           </a:p>
           <a:p>
@@ -28807,51 +28657,7 @@
                   </a:schemeClr>
                 </a:solidFill>
               </a:rPr>
-              <a:t> unten, um </a:t>
-            </a:r>
-            <a:r>
-              <a:rPr lang="de-DE" sz="1200" dirty="0" smtClean="0">
-                <a:solidFill>
-                  <a:schemeClr val="tx1">
-                    <a:lumMod val="50000"/>
-                    <a:lumOff val="50000"/>
-                  </a:schemeClr>
-                </a:solidFill>
-              </a:rPr>
-              <a:t>uns zu helfen </a:t>
-            </a:r>
-            <a:r>
-              <a:rPr lang="de-DE" sz="1200" dirty="0" smtClean="0">
-                <a:solidFill>
-                  <a:schemeClr val="tx1">
-                    <a:lumMod val="50000"/>
-                    <a:lumOff val="50000"/>
-                  </a:schemeClr>
-                </a:solidFill>
-              </a:rPr>
-              <a:t>und Eure Freunde zum </a:t>
-            </a:r>
-            <a:r>
-              <a:rPr lang="de-DE" sz="1200" dirty="0" smtClean="0">
-                <a:solidFill>
-                  <a:schemeClr val="tx1">
-                    <a:lumMod val="50000"/>
-                    <a:lumOff val="50000"/>
-                  </a:schemeClr>
-                </a:solidFill>
-              </a:rPr>
-              <a:t>Helfen aufzurufen</a:t>
-            </a:r>
-            <a:r>
-              <a:rPr lang="de-DE" sz="1200" dirty="0" smtClean="0">
-                <a:solidFill>
-                  <a:schemeClr val="tx1">
-                    <a:lumMod val="50000"/>
-                    <a:lumOff val="50000"/>
-                  </a:schemeClr>
-                </a:solidFill>
-              </a:rPr>
-              <a:t>. </a:t>
+              <a:t> unten, um uns zu helfen und Eure Freunde zum Helfen aufzurufen. </a:t>
             </a:r>
           </a:p>
           <a:p>
@@ -28895,51 +28701,7 @@
                   </a:schemeClr>
                 </a:solidFill>
               </a:rPr>
-              <a:t> und jeden Euro für willkommen-in.de einzusetzen. </a:t>
-            </a:r>
-            <a:r>
-              <a:rPr lang="de-DE" sz="1200" dirty="0" smtClean="0">
-                <a:solidFill>
-                  <a:schemeClr val="tx1">
-                    <a:lumMod val="50000"/>
-                    <a:lumOff val="50000"/>
-                  </a:schemeClr>
-                </a:solidFill>
-              </a:rPr>
-              <a:t>Überflüssiges Geld leiten wir an Hilfsorganisationen </a:t>
-            </a:r>
-            <a:r>
-              <a:rPr lang="de-DE" sz="1200" dirty="0" smtClean="0">
-                <a:solidFill>
-                  <a:schemeClr val="tx1">
-                    <a:lumMod val="50000"/>
-                    <a:lumOff val="50000"/>
-                  </a:schemeClr>
-                </a:solidFill>
-              </a:rPr>
-              <a:t>für Flüchtlinge weiter. </a:t>
-            </a:r>
-            <a:r>
-              <a:rPr lang="de-DE" sz="1200" dirty="0" smtClean="0">
-                <a:solidFill>
-                  <a:schemeClr val="tx1">
-                    <a:lumMod val="50000"/>
-                    <a:lumOff val="50000"/>
-                  </a:schemeClr>
-                </a:solidFill>
-              </a:rPr>
-              <a:t>Es </a:t>
-            </a:r>
-            <a:r>
-              <a:rPr lang="de-DE" sz="1200" dirty="0" smtClean="0">
-                <a:solidFill>
-                  <a:schemeClr val="tx1">
-                    <a:lumMod val="50000"/>
-                    <a:lumOff val="50000"/>
-                  </a:schemeClr>
-                </a:solidFill>
-              </a:rPr>
-              <a:t>spielt keine Rolle an welches Teammitglied eine Spende geht. Wir arbeiten als Team und entscheiden gemeinsam wie das Geld am besten eingesetzt wird.</a:t>
+              <a:t> und jeden Euro für willkommen-in.de einzusetzen. Überflüssiges Geld leiten wir an Hilfsorganisationen für Flüchtlinge weiter. Es spielt keine Rolle an welches Teammitglied eine Spende geht. Wir arbeiten als Team und entscheiden gemeinsam wie das Geld am besten eingesetzt wird.</a:t>
             </a:r>
             <a:endParaRPr lang="en-US" sz="1200" dirty="0">
               <a:solidFill>

</xml_diff>

<commit_message>
added Wistia video frame
</commit_message>
<xml_diff>
--- a/com.supeyou.project/doc/SupeYou.scenario.nikolaus.pptx
+++ b/com.supeyou.project/doc/SupeYou.scenario.nikolaus.pptx
@@ -359,7 +359,7 @@
               <a:pPr>
                 <a:defRPr/>
               </a:pPr>
-              <a:t>20.08.2015</a:t>
+              <a:t>28.08.2015</a:t>
             </a:fld>
             <a:endParaRPr lang="de-CH"/>
           </a:p>
@@ -556,7 +556,7 @@
               <a:pPr>
                 <a:defRPr/>
               </a:pPr>
-              <a:t>20.08.2015</a:t>
+              <a:t>28.08.2015</a:t>
             </a:fld>
             <a:endParaRPr lang="de-CH"/>
           </a:p>
@@ -763,7 +763,7 @@
               <a:pPr>
                 <a:defRPr/>
               </a:pPr>
-              <a:t>20.08.2015</a:t>
+              <a:t>28.08.2015</a:t>
             </a:fld>
             <a:endParaRPr lang="de-CH"/>
           </a:p>
@@ -960,7 +960,7 @@
               <a:pPr>
                 <a:defRPr/>
               </a:pPr>
-              <a:t>20.08.2015</a:t>
+              <a:t>28.08.2015</a:t>
             </a:fld>
             <a:endParaRPr lang="de-CH"/>
           </a:p>
@@ -1233,7 +1233,7 @@
               <a:pPr>
                 <a:defRPr/>
               </a:pPr>
-              <a:t>20.08.2015</a:t>
+              <a:t>28.08.2015</a:t>
             </a:fld>
             <a:endParaRPr lang="de-CH"/>
           </a:p>
@@ -1548,7 +1548,7 @@
               <a:pPr>
                 <a:defRPr/>
               </a:pPr>
-              <a:t>20.08.2015</a:t>
+              <a:t>28.08.2015</a:t>
             </a:fld>
             <a:endParaRPr lang="de-CH"/>
           </a:p>
@@ -1997,7 +1997,7 @@
               <a:pPr>
                 <a:defRPr/>
               </a:pPr>
-              <a:t>20.08.2015</a:t>
+              <a:t>28.08.2015</a:t>
             </a:fld>
             <a:endParaRPr lang="de-CH"/>
           </a:p>
@@ -2142,7 +2142,7 @@
               <a:pPr>
                 <a:defRPr/>
               </a:pPr>
-              <a:t>20.08.2015</a:t>
+              <a:t>28.08.2015</a:t>
             </a:fld>
             <a:endParaRPr lang="de-CH"/>
           </a:p>
@@ -2264,7 +2264,7 @@
               <a:pPr>
                 <a:defRPr/>
               </a:pPr>
-              <a:t>20.08.2015</a:t>
+              <a:t>28.08.2015</a:t>
             </a:fld>
             <a:endParaRPr lang="de-CH"/>
           </a:p>
@@ -2568,7 +2568,7 @@
               <a:pPr>
                 <a:defRPr/>
               </a:pPr>
-              <a:t>20.08.2015</a:t>
+              <a:t>28.08.2015</a:t>
             </a:fld>
             <a:endParaRPr lang="de-CH"/>
           </a:p>
@@ -2851,7 +2851,7 @@
               <a:pPr>
                 <a:defRPr/>
               </a:pPr>
-              <a:t>20.08.2015</a:t>
+              <a:t>28.08.2015</a:t>
             </a:fld>
             <a:endParaRPr lang="de-CH"/>
           </a:p>
@@ -3149,7 +3149,7 @@
               <a:pPr>
                 <a:defRPr/>
               </a:pPr>
-              <a:t>20.08.2015</a:t>
+              <a:t>28.08.2015</a:t>
             </a:fld>
             <a:endParaRPr lang="de-CH"/>
           </a:p>
@@ -45305,6 +45305,576 @@
           </p:sp>
         </p:grpSp>
       </p:grpSp>
+      <p:grpSp>
+        <p:nvGrpSpPr>
+          <p:cNvPr id="4" name="Gruppieren 3"/>
+          <p:cNvGrpSpPr/>
+          <p:nvPr/>
+        </p:nvGrpSpPr>
+        <p:grpSpPr>
+          <a:xfrm>
+            <a:off x="4860032" y="4057415"/>
+            <a:ext cx="1699345" cy="1615521"/>
+            <a:chOff x="4860032" y="4057415"/>
+            <a:chExt cx="1699345" cy="1615521"/>
+          </a:xfrm>
+        </p:grpSpPr>
+        <p:pic>
+          <p:nvPicPr>
+            <p:cNvPr id="18" name="Picture 8" descr="C:\Users\MoritzTheile\Downloads\superstickies (2).png"/>
+            <p:cNvPicPr>
+              <a:picLocks noChangeAspect="1" noChangeArrowheads="1"/>
+            </p:cNvPicPr>
+            <p:nvPr/>
+          </p:nvPicPr>
+          <p:blipFill>
+            <a:blip r:embed="rId3">
+              <a:extLst>
+                <a:ext uri="{28A0092B-C50C-407E-A947-70E740481C1C}">
+                  <a14:useLocalDpi xmlns:a14="http://schemas.microsoft.com/office/drawing/2010/main" val="0"/>
+                </a:ext>
+              </a:extLst>
+            </a:blip>
+            <a:srcRect/>
+            <a:stretch>
+              <a:fillRect/>
+            </a:stretch>
+          </p:blipFill>
+          <p:spPr bwMode="auto">
+            <a:xfrm>
+              <a:off x="4860032" y="4057415"/>
+              <a:ext cx="1699345" cy="1615521"/>
+            </a:xfrm>
+            <a:prstGeom prst="rect">
+              <a:avLst/>
+            </a:prstGeom>
+            <a:noFill/>
+            <a:extLst>
+              <a:ext uri="{909E8E84-426E-40DD-AFC4-6F175D3DCCD1}">
+                <a14:hiddenFill xmlns:a14="http://schemas.microsoft.com/office/drawing/2010/main">
+                  <a:solidFill>
+                    <a:srgbClr val="FFFFFF"/>
+                  </a:solidFill>
+                </a14:hiddenFill>
+              </a:ext>
+            </a:extLst>
+          </p:spPr>
+        </p:pic>
+        <p:sp>
+          <p:nvSpPr>
+            <p:cNvPr id="19" name="Textfeld 18"/>
+            <p:cNvSpPr txBox="1"/>
+            <p:nvPr/>
+          </p:nvSpPr>
+          <p:spPr>
+            <a:xfrm rot="21347235">
+              <a:off x="4948754" y="4433678"/>
+              <a:ext cx="1435940" cy="715581"/>
+            </a:xfrm>
+            <a:prstGeom prst="rect">
+              <a:avLst/>
+            </a:prstGeom>
+            <a:noFill/>
+          </p:spPr>
+          <p:txBody>
+            <a:bodyPr wrap="square" rtlCol="0">
+              <a:spAutoFit/>
+            </a:bodyPr>
+            <a:lstStyle/>
+            <a:p>
+              <a:pPr>
+                <a:lnSpc>
+                  <a:spcPct val="150000"/>
+                </a:lnSpc>
+              </a:pPr>
+              <a:r>
+                <a:rPr lang="de-DE" sz="900" dirty="0" smtClean="0">
+                  <a:solidFill>
+                    <a:schemeClr val="tx1">
+                      <a:lumMod val="65000"/>
+                      <a:lumOff val="35000"/>
+                    </a:schemeClr>
+                  </a:solidFill>
+                  <a:latin typeface="Kristen ITC" panose="03050502040202030202" pitchFamily="66" charset="0"/>
+                </a:rPr>
+                <a:t>Inviting with </a:t>
+              </a:r>
+              <a:r>
+                <a:rPr lang="de-DE" sz="900" dirty="0" smtClean="0">
+                  <a:solidFill>
+                    <a:schemeClr val="tx1">
+                      <a:lumMod val="65000"/>
+                      <a:lumOff val="35000"/>
+                    </a:schemeClr>
+                  </a:solidFill>
+                  <a:latin typeface="Kristen ITC" panose="03050502040202030202" pitchFamily="66" charset="0"/>
+                </a:rPr>
+                <a:t>an email is very simple </a:t>
+              </a:r>
+              <a:r>
+                <a:rPr lang="de-DE" sz="900" dirty="0" smtClean="0">
+                  <a:solidFill>
+                    <a:schemeClr val="tx1">
+                      <a:lumMod val="65000"/>
+                      <a:lumOff val="35000"/>
+                    </a:schemeClr>
+                  </a:solidFill>
+                  <a:latin typeface="Kristen ITC" panose="03050502040202030202" pitchFamily="66" charset="0"/>
+                </a:rPr>
+                <a:t>and personal.</a:t>
+              </a:r>
+            </a:p>
+          </p:txBody>
+        </p:sp>
+        <p:sp>
+          <p:nvSpPr>
+            <p:cNvPr id="20" name="Textfeld 19"/>
+            <p:cNvSpPr txBox="1"/>
+            <p:nvPr/>
+          </p:nvSpPr>
+          <p:spPr>
+            <a:xfrm rot="21288283">
+              <a:off x="5029989" y="5225190"/>
+              <a:ext cx="1362398" cy="230832"/>
+            </a:xfrm>
+            <a:prstGeom prst="rect">
+              <a:avLst/>
+            </a:prstGeom>
+            <a:noFill/>
+          </p:spPr>
+          <p:txBody>
+            <a:bodyPr wrap="square" rtlCol="0">
+              <a:spAutoFit/>
+            </a:bodyPr>
+            <a:lstStyle/>
+            <a:p>
+              <a:r>
+                <a:rPr lang="de-DE" sz="900" dirty="0" smtClean="0">
+                  <a:solidFill>
+                    <a:schemeClr val="tx1">
+                      <a:lumMod val="65000"/>
+                      <a:lumOff val="35000"/>
+                    </a:schemeClr>
+                  </a:solidFill>
+                  <a:latin typeface="Kristen ITC" panose="03050502040202030202" pitchFamily="66" charset="0"/>
+                </a:rPr>
+                <a:t>We </a:t>
+              </a:r>
+              <a:r>
+                <a:rPr lang="de-DE" sz="900" dirty="0" err="1" smtClean="0">
+                  <a:solidFill>
+                    <a:schemeClr val="tx1">
+                      <a:lumMod val="65000"/>
+                      <a:lumOff val="35000"/>
+                    </a:schemeClr>
+                  </a:solidFill>
+                  <a:latin typeface="Kristen ITC" panose="03050502040202030202" pitchFamily="66" charset="0"/>
+                </a:rPr>
+                <a:t>recommend</a:t>
+              </a:r>
+              <a:r>
+                <a:rPr lang="de-DE" sz="900" dirty="0" smtClean="0">
+                  <a:solidFill>
+                    <a:schemeClr val="tx1">
+                      <a:lumMod val="65000"/>
+                      <a:lumOff val="35000"/>
+                    </a:schemeClr>
+                  </a:solidFill>
+                  <a:latin typeface="Kristen ITC" panose="03050502040202030202" pitchFamily="66" charset="0"/>
+                </a:rPr>
+                <a:t> </a:t>
+              </a:r>
+              <a:r>
+                <a:rPr lang="de-DE" sz="900" dirty="0" err="1" smtClean="0">
+                  <a:solidFill>
+                    <a:schemeClr val="tx1">
+                      <a:lumMod val="65000"/>
+                      <a:lumOff val="35000"/>
+                    </a:schemeClr>
+                  </a:solidFill>
+                  <a:latin typeface="Kristen ITC" panose="03050502040202030202" pitchFamily="66" charset="0"/>
+                </a:rPr>
+                <a:t>it!</a:t>
+              </a:r>
+              <a:endParaRPr lang="en-US" sz="900" dirty="0">
+                <a:solidFill>
+                  <a:schemeClr val="tx1">
+                    <a:lumMod val="65000"/>
+                    <a:lumOff val="35000"/>
+                  </a:schemeClr>
+                </a:solidFill>
+                <a:latin typeface="Kristen ITC" panose="03050502040202030202" pitchFamily="66" charset="0"/>
+              </a:endParaRPr>
+            </a:p>
+          </p:txBody>
+        </p:sp>
+        <p:grpSp>
+          <p:nvGrpSpPr>
+            <p:cNvPr id="25" name="Gruppieren 24"/>
+            <p:cNvGrpSpPr/>
+            <p:nvPr/>
+          </p:nvGrpSpPr>
+          <p:grpSpPr>
+            <a:xfrm rot="19661116">
+              <a:off x="5485696" y="4126733"/>
+              <a:ext cx="149266" cy="293188"/>
+              <a:chOff x="3741744" y="4807590"/>
+              <a:chExt cx="246837" cy="409540"/>
+            </a:xfrm>
+          </p:grpSpPr>
+          <p:sp>
+            <p:nvSpPr>
+              <p:cNvPr id="32" name="Freihandform 31"/>
+              <p:cNvSpPr/>
+              <p:nvPr/>
+            </p:nvSpPr>
+            <p:spPr>
+              <a:xfrm>
+                <a:off x="3741744" y="4807590"/>
+                <a:ext cx="246831" cy="409540"/>
+              </a:xfrm>
+              <a:custGeom>
+                <a:avLst/>
+                <a:gdLst>
+                  <a:gd name="connsiteX0" fmla="*/ 0 w 246832"/>
+                  <a:gd name="connsiteY0" fmla="*/ 409540 h 409540"/>
+                  <a:gd name="connsiteX1" fmla="*/ 5610 w 246832"/>
+                  <a:gd name="connsiteY1" fmla="*/ 381491 h 409540"/>
+                  <a:gd name="connsiteX2" fmla="*/ 39269 w 246832"/>
+                  <a:gd name="connsiteY2" fmla="*/ 325393 h 409540"/>
+                  <a:gd name="connsiteX3" fmla="*/ 67318 w 246832"/>
+                  <a:gd name="connsiteY3" fmla="*/ 274905 h 409540"/>
+                  <a:gd name="connsiteX4" fmla="*/ 100977 w 246832"/>
+                  <a:gd name="connsiteY4" fmla="*/ 224416 h 409540"/>
+                  <a:gd name="connsiteX5" fmla="*/ 129026 w 246832"/>
+                  <a:gd name="connsiteY5" fmla="*/ 173928 h 409540"/>
+                  <a:gd name="connsiteX6" fmla="*/ 190734 w 246832"/>
+                  <a:gd name="connsiteY6" fmla="*/ 84171 h 409540"/>
+                  <a:gd name="connsiteX7" fmla="*/ 230003 w 246832"/>
+                  <a:gd name="connsiteY7" fmla="*/ 22463 h 409540"/>
+                  <a:gd name="connsiteX8" fmla="*/ 246832 w 246832"/>
+                  <a:gd name="connsiteY8" fmla="*/ 24 h 409540"/>
+                </a:gdLst>
+                <a:ahLst/>
+                <a:cxnLst>
+                  <a:cxn ang="0">
+                    <a:pos x="connsiteX0" y="connsiteY0"/>
+                  </a:cxn>
+                  <a:cxn ang="0">
+                    <a:pos x="connsiteX1" y="connsiteY1"/>
+                  </a:cxn>
+                  <a:cxn ang="0">
+                    <a:pos x="connsiteX2" y="connsiteY2"/>
+                  </a:cxn>
+                  <a:cxn ang="0">
+                    <a:pos x="connsiteX3" y="connsiteY3"/>
+                  </a:cxn>
+                  <a:cxn ang="0">
+                    <a:pos x="connsiteX4" y="connsiteY4"/>
+                  </a:cxn>
+                  <a:cxn ang="0">
+                    <a:pos x="connsiteX5" y="connsiteY5"/>
+                  </a:cxn>
+                  <a:cxn ang="0">
+                    <a:pos x="connsiteX6" y="connsiteY6"/>
+                  </a:cxn>
+                  <a:cxn ang="0">
+                    <a:pos x="connsiteX7" y="connsiteY7"/>
+                  </a:cxn>
+                  <a:cxn ang="0">
+                    <a:pos x="connsiteX8" y="connsiteY8"/>
+                  </a:cxn>
+                </a:cxnLst>
+                <a:rect l="l" t="t" r="r" b="b"/>
+                <a:pathLst>
+                  <a:path w="246832" h="409540">
+                    <a:moveTo>
+                      <a:pt x="0" y="409540"/>
+                    </a:moveTo>
+                    <a:cubicBezTo>
+                      <a:pt x="1870" y="400190"/>
+                      <a:pt x="2595" y="390537"/>
+                      <a:pt x="5610" y="381491"/>
+                    </a:cubicBezTo>
+                    <a:cubicBezTo>
+                      <a:pt x="12021" y="362259"/>
+                      <a:pt x="29670" y="341392"/>
+                      <a:pt x="39269" y="325393"/>
+                    </a:cubicBezTo>
+                    <a:cubicBezTo>
+                      <a:pt x="49174" y="308884"/>
+                      <a:pt x="57279" y="291332"/>
+                      <a:pt x="67318" y="274905"/>
+                    </a:cubicBezTo>
+                    <a:cubicBezTo>
+                      <a:pt x="77865" y="257646"/>
+                      <a:pt x="90430" y="241675"/>
+                      <a:pt x="100977" y="224416"/>
+                    </a:cubicBezTo>
+                    <a:cubicBezTo>
+                      <a:pt x="111016" y="207989"/>
+                      <a:pt x="118567" y="190091"/>
+                      <a:pt x="129026" y="173928"/>
+                    </a:cubicBezTo>
+                    <a:cubicBezTo>
+                      <a:pt x="189636" y="80258"/>
+                      <a:pt x="137334" y="177621"/>
+                      <a:pt x="190734" y="84171"/>
+                    </a:cubicBezTo>
+                    <a:cubicBezTo>
+                      <a:pt x="266822" y="-48984"/>
+                      <a:pt x="148273" y="145057"/>
+                      <a:pt x="230003" y="22463"/>
+                    </a:cubicBezTo>
+                    <a:cubicBezTo>
+                      <a:pt x="246078" y="-1649"/>
+                      <a:pt x="231961" y="24"/>
+                      <a:pt x="246832" y="24"/>
+                    </a:cubicBezTo>
+                  </a:path>
+                </a:pathLst>
+              </a:custGeom>
+              <a:noFill/>
+              <a:ln w="12700">
+                <a:solidFill>
+                  <a:schemeClr val="tx1">
+                    <a:lumMod val="50000"/>
+                    <a:lumOff val="50000"/>
+                  </a:schemeClr>
+                </a:solidFill>
+              </a:ln>
+            </p:spPr>
+            <p:style>
+              <a:lnRef idx="2">
+                <a:schemeClr val="accent1">
+                  <a:shade val="50000"/>
+                </a:schemeClr>
+              </a:lnRef>
+              <a:fillRef idx="1">
+                <a:schemeClr val="accent1"/>
+              </a:fillRef>
+              <a:effectRef idx="0">
+                <a:schemeClr val="accent1"/>
+              </a:effectRef>
+              <a:fontRef idx="minor">
+                <a:schemeClr val="lt1"/>
+              </a:fontRef>
+            </p:style>
+            <p:txBody>
+              <a:bodyPr rtlCol="0" anchor="ctr"/>
+              <a:lstStyle/>
+              <a:p>
+                <a:pPr algn="ctr"/>
+                <a:endParaRPr lang="en-US" baseline="-25000"/>
+              </a:p>
+            </p:txBody>
+          </p:sp>
+          <p:sp>
+            <p:nvSpPr>
+              <p:cNvPr id="36" name="Freihandform 35"/>
+              <p:cNvSpPr/>
+              <p:nvPr/>
+            </p:nvSpPr>
+            <p:spPr>
+              <a:xfrm>
+                <a:off x="3982969" y="4807612"/>
+                <a:ext cx="5612" cy="207563"/>
+              </a:xfrm>
+              <a:custGeom>
+                <a:avLst/>
+                <a:gdLst>
+                  <a:gd name="connsiteX0" fmla="*/ 0 w 5612"/>
+                  <a:gd name="connsiteY0" fmla="*/ 0 h 207563"/>
+                  <a:gd name="connsiteX1" fmla="*/ 5610 w 5612"/>
+                  <a:gd name="connsiteY1" fmla="*/ 207563 h 207563"/>
+                </a:gdLst>
+                <a:ahLst/>
+                <a:cxnLst>
+                  <a:cxn ang="0">
+                    <a:pos x="connsiteX0" y="connsiteY0"/>
+                  </a:cxn>
+                  <a:cxn ang="0">
+                    <a:pos x="connsiteX1" y="connsiteY1"/>
+                  </a:cxn>
+                </a:cxnLst>
+                <a:rect l="l" t="t" r="r" b="b"/>
+                <a:pathLst>
+                  <a:path w="5612" h="207563">
+                    <a:moveTo>
+                      <a:pt x="0" y="0"/>
+                    </a:moveTo>
+                    <a:cubicBezTo>
+                      <a:pt x="5902" y="188859"/>
+                      <a:pt x="5610" y="119647"/>
+                      <a:pt x="5610" y="207563"/>
+                    </a:cubicBezTo>
+                  </a:path>
+                </a:pathLst>
+              </a:custGeom>
+              <a:noFill/>
+              <a:ln w="12700">
+                <a:solidFill>
+                  <a:schemeClr val="tx1">
+                    <a:lumMod val="50000"/>
+                    <a:lumOff val="50000"/>
+                  </a:schemeClr>
+                </a:solidFill>
+              </a:ln>
+            </p:spPr>
+            <p:style>
+              <a:lnRef idx="2">
+                <a:schemeClr val="accent1">
+                  <a:shade val="50000"/>
+                </a:schemeClr>
+              </a:lnRef>
+              <a:fillRef idx="1">
+                <a:schemeClr val="accent1"/>
+              </a:fillRef>
+              <a:effectRef idx="0">
+                <a:schemeClr val="accent1"/>
+              </a:effectRef>
+              <a:fontRef idx="minor">
+                <a:schemeClr val="lt1"/>
+              </a:fontRef>
+            </p:style>
+            <p:txBody>
+              <a:bodyPr rtlCol="0" anchor="ctr"/>
+              <a:lstStyle/>
+              <a:p>
+                <a:pPr algn="ctr"/>
+                <a:endParaRPr lang="en-US" baseline="-25000"/>
+              </a:p>
+            </p:txBody>
+          </p:sp>
+          <p:sp>
+            <p:nvSpPr>
+              <p:cNvPr id="38" name="Freihandform 37"/>
+              <p:cNvSpPr/>
+              <p:nvPr/>
+            </p:nvSpPr>
+            <p:spPr>
+              <a:xfrm rot="20854090">
+                <a:off x="3769796" y="4834797"/>
+                <a:ext cx="213173" cy="61708"/>
+              </a:xfrm>
+              <a:custGeom>
+                <a:avLst/>
+                <a:gdLst>
+                  <a:gd name="connsiteX0" fmla="*/ 213173 w 213173"/>
+                  <a:gd name="connsiteY0" fmla="*/ 0 h 61708"/>
+                  <a:gd name="connsiteX1" fmla="*/ 162685 w 213173"/>
+                  <a:gd name="connsiteY1" fmla="*/ 16830 h 61708"/>
+                  <a:gd name="connsiteX2" fmla="*/ 140246 w 213173"/>
+                  <a:gd name="connsiteY2" fmla="*/ 22440 h 61708"/>
+                  <a:gd name="connsiteX3" fmla="*/ 123416 w 213173"/>
+                  <a:gd name="connsiteY3" fmla="*/ 28049 h 61708"/>
+                  <a:gd name="connsiteX4" fmla="*/ 84148 w 213173"/>
+                  <a:gd name="connsiteY4" fmla="*/ 33659 h 61708"/>
+                  <a:gd name="connsiteX5" fmla="*/ 28049 w 213173"/>
+                  <a:gd name="connsiteY5" fmla="*/ 50489 h 61708"/>
+                  <a:gd name="connsiteX6" fmla="*/ 0 w 213173"/>
+                  <a:gd name="connsiteY6" fmla="*/ 61708 h 61708"/>
+                </a:gdLst>
+                <a:ahLst/>
+                <a:cxnLst>
+                  <a:cxn ang="0">
+                    <a:pos x="connsiteX0" y="connsiteY0"/>
+                  </a:cxn>
+                  <a:cxn ang="0">
+                    <a:pos x="connsiteX1" y="connsiteY1"/>
+                  </a:cxn>
+                  <a:cxn ang="0">
+                    <a:pos x="connsiteX2" y="connsiteY2"/>
+                  </a:cxn>
+                  <a:cxn ang="0">
+                    <a:pos x="connsiteX3" y="connsiteY3"/>
+                  </a:cxn>
+                  <a:cxn ang="0">
+                    <a:pos x="connsiteX4" y="connsiteY4"/>
+                  </a:cxn>
+                  <a:cxn ang="0">
+                    <a:pos x="connsiteX5" y="connsiteY5"/>
+                  </a:cxn>
+                  <a:cxn ang="0">
+                    <a:pos x="connsiteX6" y="connsiteY6"/>
+                  </a:cxn>
+                </a:cxnLst>
+                <a:rect l="l" t="t" r="r" b="b"/>
+                <a:pathLst>
+                  <a:path w="213173" h="61708">
+                    <a:moveTo>
+                      <a:pt x="213173" y="0"/>
+                    </a:moveTo>
+                    <a:cubicBezTo>
+                      <a:pt x="196344" y="5610"/>
+                      <a:pt x="179895" y="12527"/>
+                      <a:pt x="162685" y="16830"/>
+                    </a:cubicBezTo>
+                    <a:cubicBezTo>
+                      <a:pt x="155205" y="18700"/>
+                      <a:pt x="147659" y="20322"/>
+                      <a:pt x="140246" y="22440"/>
+                    </a:cubicBezTo>
+                    <a:cubicBezTo>
+                      <a:pt x="134560" y="24064"/>
+                      <a:pt x="129215" y="26889"/>
+                      <a:pt x="123416" y="28049"/>
+                    </a:cubicBezTo>
+                    <a:cubicBezTo>
+                      <a:pt x="110451" y="30642"/>
+                      <a:pt x="97157" y="31294"/>
+                      <a:pt x="84148" y="33659"/>
+                    </a:cubicBezTo>
+                    <a:cubicBezTo>
+                      <a:pt x="65493" y="37051"/>
+                      <a:pt x="45618" y="44633"/>
+                      <a:pt x="28049" y="50489"/>
+                    </a:cubicBezTo>
+                    <a:cubicBezTo>
+                      <a:pt x="7249" y="57422"/>
+                      <a:pt x="16512" y="53452"/>
+                      <a:pt x="0" y="61708"/>
+                    </a:cubicBezTo>
+                  </a:path>
+                </a:pathLst>
+              </a:custGeom>
+              <a:noFill/>
+              <a:ln w="12700">
+                <a:solidFill>
+                  <a:schemeClr val="tx1">
+                    <a:lumMod val="50000"/>
+                    <a:lumOff val="50000"/>
+                  </a:schemeClr>
+                </a:solidFill>
+              </a:ln>
+            </p:spPr>
+            <p:style>
+              <a:lnRef idx="2">
+                <a:schemeClr val="accent1">
+                  <a:shade val="50000"/>
+                </a:schemeClr>
+              </a:lnRef>
+              <a:fillRef idx="1">
+                <a:schemeClr val="accent1"/>
+              </a:fillRef>
+              <a:effectRef idx="0">
+                <a:schemeClr val="accent1"/>
+              </a:effectRef>
+              <a:fontRef idx="minor">
+                <a:schemeClr val="lt1"/>
+              </a:fontRef>
+            </p:style>
+            <p:txBody>
+              <a:bodyPr rtlCol="0" anchor="ctr"/>
+              <a:lstStyle/>
+              <a:p>
+                <a:pPr algn="ctr"/>
+                <a:endParaRPr lang="en-US" baseline="-25000"/>
+              </a:p>
+            </p:txBody>
+          </p:sp>
+        </p:grpSp>
+      </p:grpSp>
     </p:spTree>
     <p:extLst>
       <p:ext uri="{BB962C8B-B14F-4D97-AF65-F5344CB8AC3E}">

</xml_diff>